<commit_message>
atualização dos dados, gráficos etc
</commit_message>
<xml_diff>
--- a/espiral-anotado.pptx
+++ b/espiral-anotado.pptx
@@ -104,6 +104,11 @@
       </a:defRPr>
     </a:lvl9pPr>
   </p:defaultTextStyle>
+  <p:extLst>
+    <p:ext uri="{EFAFB233-063F-42B5-8137-9DF3F51BA10A}">
+      <p15:sldGuideLst xmlns:p15="http://schemas.microsoft.com/office/powerpoint/2012/main"/>
+    </p:ext>
+  </p:extLst>
 </p:presentation>
 </file>
 
@@ -238,7 +243,7 @@
           <a:p>
             <a:fld id="{88C70E8E-9716-6242-A2BA-F24F193A2D04}" type="datetimeFigureOut">
               <a:rPr lang="en-US" smtClean="0"/>
-              <a:t>11/8/24</a:t>
+              <a:t>11/11/2024</a:t>
             </a:fld>
             <a:endParaRPr lang="en-US"/>
           </a:p>
@@ -280,7 +285,7 @@
           <a:p>
             <a:fld id="{55F0F61C-E4C8-4247-A31B-EA12B1FFFA24}" type="slidenum">
               <a:rPr lang="en-US" smtClean="0"/>
-              <a:t>‹#›</a:t>
+              <a:t>‹nº›</a:t>
             </a:fld>
             <a:endParaRPr lang="en-US"/>
           </a:p>
@@ -408,7 +413,7 @@
           <a:p>
             <a:fld id="{88C70E8E-9716-6242-A2BA-F24F193A2D04}" type="datetimeFigureOut">
               <a:rPr lang="en-US" smtClean="0"/>
-              <a:t>11/8/24</a:t>
+              <a:t>11/11/2024</a:t>
             </a:fld>
             <a:endParaRPr lang="en-US"/>
           </a:p>
@@ -450,7 +455,7 @@
           <a:p>
             <a:fld id="{55F0F61C-E4C8-4247-A31B-EA12B1FFFA24}" type="slidenum">
               <a:rPr lang="en-US" smtClean="0"/>
-              <a:t>‹#›</a:t>
+              <a:t>‹nº›</a:t>
             </a:fld>
             <a:endParaRPr lang="en-US"/>
           </a:p>
@@ -588,7 +593,7 @@
           <a:p>
             <a:fld id="{88C70E8E-9716-6242-A2BA-F24F193A2D04}" type="datetimeFigureOut">
               <a:rPr lang="en-US" smtClean="0"/>
-              <a:t>11/8/24</a:t>
+              <a:t>11/11/2024</a:t>
             </a:fld>
             <a:endParaRPr lang="en-US"/>
           </a:p>
@@ -630,7 +635,7 @@
           <a:p>
             <a:fld id="{55F0F61C-E4C8-4247-A31B-EA12B1FFFA24}" type="slidenum">
               <a:rPr lang="en-US" smtClean="0"/>
-              <a:t>‹#›</a:t>
+              <a:t>‹nº›</a:t>
             </a:fld>
             <a:endParaRPr lang="en-US"/>
           </a:p>
@@ -758,7 +763,7 @@
           <a:p>
             <a:fld id="{88C70E8E-9716-6242-A2BA-F24F193A2D04}" type="datetimeFigureOut">
               <a:rPr lang="en-US" smtClean="0"/>
-              <a:t>11/8/24</a:t>
+              <a:t>11/11/2024</a:t>
             </a:fld>
             <a:endParaRPr lang="en-US"/>
           </a:p>
@@ -800,7 +805,7 @@
           <a:p>
             <a:fld id="{55F0F61C-E4C8-4247-A31B-EA12B1FFFA24}" type="slidenum">
               <a:rPr lang="en-US" smtClean="0"/>
-              <a:t>‹#›</a:t>
+              <a:t>‹nº›</a:t>
             </a:fld>
             <a:endParaRPr lang="en-US"/>
           </a:p>
@@ -1004,7 +1009,7 @@
           <a:p>
             <a:fld id="{88C70E8E-9716-6242-A2BA-F24F193A2D04}" type="datetimeFigureOut">
               <a:rPr lang="en-US" smtClean="0"/>
-              <a:t>11/8/24</a:t>
+              <a:t>11/11/2024</a:t>
             </a:fld>
             <a:endParaRPr lang="en-US"/>
           </a:p>
@@ -1046,7 +1051,7 @@
           <a:p>
             <a:fld id="{55F0F61C-E4C8-4247-A31B-EA12B1FFFA24}" type="slidenum">
               <a:rPr lang="en-US" smtClean="0"/>
-              <a:t>‹#›</a:t>
+              <a:t>‹nº›</a:t>
             </a:fld>
             <a:endParaRPr lang="en-US"/>
           </a:p>
@@ -1236,7 +1241,7 @@
           <a:p>
             <a:fld id="{88C70E8E-9716-6242-A2BA-F24F193A2D04}" type="datetimeFigureOut">
               <a:rPr lang="en-US" smtClean="0"/>
-              <a:t>11/8/24</a:t>
+              <a:t>11/11/2024</a:t>
             </a:fld>
             <a:endParaRPr lang="en-US"/>
           </a:p>
@@ -1278,7 +1283,7 @@
           <a:p>
             <a:fld id="{55F0F61C-E4C8-4247-A31B-EA12B1FFFA24}" type="slidenum">
               <a:rPr lang="en-US" smtClean="0"/>
-              <a:t>‹#›</a:t>
+              <a:t>‹nº›</a:t>
             </a:fld>
             <a:endParaRPr lang="en-US"/>
           </a:p>
@@ -1603,7 +1608,7 @@
           <a:p>
             <a:fld id="{88C70E8E-9716-6242-A2BA-F24F193A2D04}" type="datetimeFigureOut">
               <a:rPr lang="en-US" smtClean="0"/>
-              <a:t>11/8/24</a:t>
+              <a:t>11/11/2024</a:t>
             </a:fld>
             <a:endParaRPr lang="en-US"/>
           </a:p>
@@ -1645,7 +1650,7 @@
           <a:p>
             <a:fld id="{55F0F61C-E4C8-4247-A31B-EA12B1FFFA24}" type="slidenum">
               <a:rPr lang="en-US" smtClean="0"/>
-              <a:t>‹#›</a:t>
+              <a:t>‹nº›</a:t>
             </a:fld>
             <a:endParaRPr lang="en-US"/>
           </a:p>
@@ -1721,7 +1726,7 @@
           <a:p>
             <a:fld id="{88C70E8E-9716-6242-A2BA-F24F193A2D04}" type="datetimeFigureOut">
               <a:rPr lang="en-US" smtClean="0"/>
-              <a:t>11/8/24</a:t>
+              <a:t>11/11/2024</a:t>
             </a:fld>
             <a:endParaRPr lang="en-US"/>
           </a:p>
@@ -1763,7 +1768,7 @@
           <a:p>
             <a:fld id="{55F0F61C-E4C8-4247-A31B-EA12B1FFFA24}" type="slidenum">
               <a:rPr lang="en-US" smtClean="0"/>
-              <a:t>‹#›</a:t>
+              <a:t>‹nº›</a:t>
             </a:fld>
             <a:endParaRPr lang="en-US"/>
           </a:p>
@@ -1816,7 +1821,7 @@
           <a:p>
             <a:fld id="{88C70E8E-9716-6242-A2BA-F24F193A2D04}" type="datetimeFigureOut">
               <a:rPr lang="en-US" smtClean="0"/>
-              <a:t>11/8/24</a:t>
+              <a:t>11/11/2024</a:t>
             </a:fld>
             <a:endParaRPr lang="en-US"/>
           </a:p>
@@ -1858,7 +1863,7 @@
           <a:p>
             <a:fld id="{55F0F61C-E4C8-4247-A31B-EA12B1FFFA24}" type="slidenum">
               <a:rPr lang="en-US" smtClean="0"/>
-              <a:t>‹#›</a:t>
+              <a:t>‹nº›</a:t>
             </a:fld>
             <a:endParaRPr lang="en-US"/>
           </a:p>
@@ -2093,7 +2098,7 @@
           <a:p>
             <a:fld id="{88C70E8E-9716-6242-A2BA-F24F193A2D04}" type="datetimeFigureOut">
               <a:rPr lang="en-US" smtClean="0"/>
-              <a:t>11/8/24</a:t>
+              <a:t>11/11/2024</a:t>
             </a:fld>
             <a:endParaRPr lang="en-US"/>
           </a:p>
@@ -2135,7 +2140,7 @@
           <a:p>
             <a:fld id="{55F0F61C-E4C8-4247-A31B-EA12B1FFFA24}" type="slidenum">
               <a:rPr lang="en-US" smtClean="0"/>
-              <a:t>‹#›</a:t>
+              <a:t>‹nº›</a:t>
             </a:fld>
             <a:endParaRPr lang="en-US"/>
           </a:p>
@@ -2350,7 +2355,7 @@
           <a:p>
             <a:fld id="{88C70E8E-9716-6242-A2BA-F24F193A2D04}" type="datetimeFigureOut">
               <a:rPr lang="en-US" smtClean="0"/>
-              <a:t>11/8/24</a:t>
+              <a:t>11/11/2024</a:t>
             </a:fld>
             <a:endParaRPr lang="en-US"/>
           </a:p>
@@ -2392,7 +2397,7 @@
           <a:p>
             <a:fld id="{55F0F61C-E4C8-4247-A31B-EA12B1FFFA24}" type="slidenum">
               <a:rPr lang="en-US" smtClean="0"/>
-              <a:t>‹#›</a:t>
+              <a:t>‹nº›</a:t>
             </a:fld>
             <a:endParaRPr lang="en-US"/>
           </a:p>
@@ -2563,7 +2568,7 @@
           <a:p>
             <a:fld id="{88C70E8E-9716-6242-A2BA-F24F193A2D04}" type="datetimeFigureOut">
               <a:rPr lang="en-US" smtClean="0"/>
-              <a:t>11/8/24</a:t>
+              <a:t>11/11/2024</a:t>
             </a:fld>
             <a:endParaRPr lang="en-US"/>
           </a:p>
@@ -2641,7 +2646,7 @@
           <a:p>
             <a:fld id="{55F0F61C-E4C8-4247-A31B-EA12B1FFFA24}" type="slidenum">
               <a:rPr lang="en-US" smtClean="0"/>
-              <a:t>‹#›</a:t>
+              <a:t>‹nº›</a:t>
             </a:fld>
             <a:endParaRPr lang="en-US"/>
           </a:p>

</xml_diff>